<commit_message>
docs: documento atualizado e apresentacao pprt
</commit_message>
<xml_diff>
--- a/entregas-aula/PetConnect_Apresentacao_1.pptx
+++ b/entregas-aula/PetConnect_Apresentacao_1.pptx
@@ -129,6 +129,58 @@
     </p:ext>
   </p:extLst>
 </p:presentation>
+</file>
+
+<file path=ppt/revisionInfo.xml><?xml version="1.0" encoding="utf-8"?>
+<p1510:revInfo xmlns:a="http://schemas.openxmlformats.org/drawingml/2006/main" xmlns:r="http://schemas.openxmlformats.org/officeDocument/2006/relationships" xmlns:p1510="http://schemas.microsoft.com/office/powerpoint/2015/10/main">
+  <p1510:revLst>
+    <p1510:client id="{C9FBE80D-1908-4BC3-93CB-D65CF999E747}" v="7" dt="2024-03-14T22:00:07.099"/>
+  </p1510:revLst>
+</p1510:revInfo>
+</file>
+
+<file path=ppt/changesInfos/changesInfo1.xml><?xml version="1.0" encoding="utf-8"?>
+<pc:chgInfo xmlns:a="http://schemas.openxmlformats.org/drawingml/2006/main" xmlns:r="http://schemas.openxmlformats.org/officeDocument/2006/relationships" xmlns:ac="http://schemas.microsoft.com/office/drawing/2013/main/command" xmlns:pc="http://schemas.microsoft.com/office/powerpoint/2013/main/command">
+  <pc:docChgLst>
+    <pc:chgData name="Gabriel Gomes Fachineli" userId="cbf62a189aee5e00" providerId="LiveId" clId="{C9FBE80D-1908-4BC3-93CB-D65CF999E747}"/>
+    <pc:docChg chg="modSld sldOrd">
+      <pc:chgData name="Gabriel Gomes Fachineli" userId="cbf62a189aee5e00" providerId="LiveId" clId="{C9FBE80D-1908-4BC3-93CB-D65CF999E747}" dt="2024-03-14T22:01:39.426" v="15" actId="20577"/>
+      <pc:docMkLst>
+        <pc:docMk/>
+      </pc:docMkLst>
+      <pc:sldChg chg="modSp ord">
+        <pc:chgData name="Gabriel Gomes Fachineli" userId="cbf62a189aee5e00" providerId="LiveId" clId="{C9FBE80D-1908-4BC3-93CB-D65CF999E747}" dt="2024-03-14T22:00:19.626" v="6"/>
+        <pc:sldMkLst>
+          <pc:docMk/>
+          <pc:sldMk cId="326850275" sldId="467"/>
+        </pc:sldMkLst>
+        <pc:graphicFrameChg chg="mod">
+          <ac:chgData name="Gabriel Gomes Fachineli" userId="cbf62a189aee5e00" providerId="LiveId" clId="{C9FBE80D-1908-4BC3-93CB-D65CF999E747}" dt="2024-03-14T22:00:07.099" v="4" actId="20577"/>
+          <ac:graphicFrameMkLst>
+            <pc:docMk/>
+            <pc:sldMk cId="326850275" sldId="467"/>
+            <ac:graphicFrameMk id="4" creationId="{0EB22A95-3063-134F-8E50-504539DB02E7}"/>
+          </ac:graphicFrameMkLst>
+        </pc:graphicFrameChg>
+      </pc:sldChg>
+      <pc:sldChg chg="modSp mod">
+        <pc:chgData name="Gabriel Gomes Fachineli" userId="cbf62a189aee5e00" providerId="LiveId" clId="{C9FBE80D-1908-4BC3-93CB-D65CF999E747}" dt="2024-03-14T22:01:39.426" v="15" actId="20577"/>
+        <pc:sldMkLst>
+          <pc:docMk/>
+          <pc:sldMk cId="467788425" sldId="469"/>
+        </pc:sldMkLst>
+        <pc:spChg chg="mod">
+          <ac:chgData name="Gabriel Gomes Fachineli" userId="cbf62a189aee5e00" providerId="LiveId" clId="{C9FBE80D-1908-4BC3-93CB-D65CF999E747}" dt="2024-03-14T22:01:39.426" v="15" actId="20577"/>
+          <ac:spMkLst>
+            <pc:docMk/>
+            <pc:sldMk cId="467788425" sldId="469"/>
+            <ac:spMk id="3" creationId="{843C61F0-FEDF-462D-A503-4EE84BBD9274}"/>
+          </ac:spMkLst>
+        </pc:spChg>
+      </pc:sldChg>
+    </pc:docChg>
+  </pc:docChgLst>
+</pc:chgInfo>
 </file>
 
 <file path=ppt/diagrams/colors1.xml><?xml version="1.0" encoding="utf-8"?>
@@ -4780,7 +4832,7 @@
           </a:pPr>
           <a:r>
             <a:rPr lang="pt-BR" dirty="0"/>
-            <a:t>4. Protegido por medidas de segurança robustas, como criptografia de dados e autenticação de dois fatores.</a:t>
+            <a:t>4. Protegido por medidas de segurança robustas, como criptografia de dados.</a:t>
           </a:r>
         </a:p>
       </dgm:t>
@@ -4797,79 +4849,6 @@
       </dgm:t>
     </dgm:pt>
     <dgm:pt modelId="{A2AB4660-8039-4AC9-8D3D-035006CE38C9}" type="sibTrans" cxnId="{327B98B8-BBAD-4C06-9111-E2F7F043829D}">
-      <dgm:prSet/>
-      <dgm:spPr/>
-      <dgm:t>
-        <a:bodyPr/>
-        <a:lstStyle/>
-        <a:p>
-          <a:endParaRPr lang="pt-BR"/>
-        </a:p>
-      </dgm:t>
-    </dgm:pt>
-    <dgm:pt modelId="{5D3FDCBC-2A93-4DC6-B777-AA9115BC216E}">
-      <dgm:prSet phldrT="[Texto]"/>
-      <dgm:spPr>
-        <a:solidFill>
-          <a:schemeClr val="tx2">
-            <a:lumMod val="50000"/>
-          </a:schemeClr>
-        </a:solidFill>
-      </dgm:spPr>
-      <dgm:t>
-        <a:bodyPr/>
-        <a:lstStyle/>
-        <a:p>
-          <a:pPr algn="just">
-            <a:buNone/>
-          </a:pPr>
-          <a:r>
-            <a:rPr lang="pt-BR" dirty="0"/>
-            <a:t>1. Uma plataforma de rede social para donos de animais de estimação.</a:t>
-          </a:r>
-        </a:p>
-        <a:p>
-          <a:pPr algn="just">
-            <a:buNone/>
-          </a:pPr>
-          <a:r>
-            <a:rPr lang="pt-BR" dirty="0"/>
-            <a:t>2. Um aplicativo.</a:t>
-          </a:r>
-        </a:p>
-        <a:p>
-          <a:pPr algn="l">
-            <a:buFont typeface="Arial" panose="020B0604020202020204" pitchFamily="34" charset="0"/>
-            <a:buNone/>
-          </a:pPr>
-          <a:r>
-            <a:rPr lang="pt-BR" dirty="0"/>
-            <a:t>3. Um sistema baseado em servidor local que requer infraestrutura de TI complexa para funcionar.</a:t>
-          </a:r>
-        </a:p>
-        <a:p>
-          <a:pPr algn="just">
-            <a:buNone/>
-          </a:pPr>
-          <a:r>
-            <a:rPr lang="pt-BR" dirty="0"/>
-            <a:t>4. Um sistema que armazena dados sensíveis sem conformidade com padrões de segurança como o GDPR ou LGPD.</a:t>
-          </a:r>
-        </a:p>
-      </dgm:t>
-    </dgm:pt>
-    <dgm:pt modelId="{4FD3CC4A-51B6-4672-AD0D-B03A028410C4}" type="parTrans" cxnId="{8E7AF065-5297-4AB8-A639-0A99883BBDC5}">
-      <dgm:prSet/>
-      <dgm:spPr/>
-      <dgm:t>
-        <a:bodyPr/>
-        <a:lstStyle/>
-        <a:p>
-          <a:endParaRPr lang="pt-BR"/>
-        </a:p>
-      </dgm:t>
-    </dgm:pt>
-    <dgm:pt modelId="{0458B6A8-9F4B-4A36-B6E9-E43641534680}" type="sibTrans" cxnId="{8E7AF065-5297-4AB8-A639-0A99883BBDC5}">
       <dgm:prSet/>
       <dgm:spPr/>
       <dgm:t>
@@ -5035,6 +5014,79 @@
       </dgm:t>
     </dgm:pt>
     <dgm:pt modelId="{3FF21285-D9EF-4AD2-A1AA-1E9C4BAA6ABF}" type="sibTrans" cxnId="{D0D11E2E-E596-4CC1-94DF-B7FDA11399DF}">
+      <dgm:prSet/>
+      <dgm:spPr/>
+      <dgm:t>
+        <a:bodyPr/>
+        <a:lstStyle/>
+        <a:p>
+          <a:endParaRPr lang="pt-BR"/>
+        </a:p>
+      </dgm:t>
+    </dgm:pt>
+    <dgm:pt modelId="{5D3FDCBC-2A93-4DC6-B777-AA9115BC216E}">
+      <dgm:prSet phldrT="[Texto]"/>
+      <dgm:spPr>
+        <a:solidFill>
+          <a:schemeClr val="tx2">
+            <a:lumMod val="50000"/>
+          </a:schemeClr>
+        </a:solidFill>
+      </dgm:spPr>
+      <dgm:t>
+        <a:bodyPr/>
+        <a:lstStyle/>
+        <a:p>
+          <a:pPr algn="just">
+            <a:buNone/>
+          </a:pPr>
+          <a:r>
+            <a:rPr lang="pt-BR" dirty="0"/>
+            <a:t>1. Uma plataforma de rede social para donos de animais de estimação.</a:t>
+          </a:r>
+        </a:p>
+        <a:p>
+          <a:pPr algn="just">
+            <a:buNone/>
+          </a:pPr>
+          <a:r>
+            <a:rPr lang="pt-BR" dirty="0"/>
+            <a:t>2. Um aplicativo.</a:t>
+          </a:r>
+        </a:p>
+        <a:p>
+          <a:pPr algn="l">
+            <a:buFont typeface="Arial" panose="020B0604020202020204" pitchFamily="34" charset="0"/>
+            <a:buNone/>
+          </a:pPr>
+          <a:r>
+            <a:rPr lang="pt-BR" dirty="0"/>
+            <a:t>3. Um sistema baseado em servidor local que requer infraestrutura de TI complexa para funcionar.</a:t>
+          </a:r>
+        </a:p>
+        <a:p>
+          <a:pPr algn="just">
+            <a:buNone/>
+          </a:pPr>
+          <a:r>
+            <a:rPr lang="pt-BR" dirty="0"/>
+            <a:t>4. Um sistema que armazena dados sensíveis sem conformidade com padrões de segurança como o GDPR ou LGPD.</a:t>
+          </a:r>
+        </a:p>
+      </dgm:t>
+    </dgm:pt>
+    <dgm:pt modelId="{0458B6A8-9F4B-4A36-B6E9-E43641534680}" type="sibTrans" cxnId="{8E7AF065-5297-4AB8-A639-0A99883BBDC5}">
+      <dgm:prSet/>
+      <dgm:spPr/>
+      <dgm:t>
+        <a:bodyPr/>
+        <a:lstStyle/>
+        <a:p>
+          <a:endParaRPr lang="pt-BR"/>
+        </a:p>
+      </dgm:t>
+    </dgm:pt>
+    <dgm:pt modelId="{4FD3CC4A-51B6-4672-AD0D-B03A028410C4}" type="parTrans" cxnId="{8E7AF065-5297-4AB8-A639-0A99883BBDC5}">
       <dgm:prSet/>
       <dgm:spPr/>
       <dgm:t>
@@ -7114,7 +7166,7 @@
           </a:pPr>
           <a:r>
             <a:rPr lang="pt-BR" sz="1000" kern="1200" dirty="0"/>
-            <a:t>4. Protegido por medidas de segurança robustas, como criptografia de dados e autenticação de dois fatores.</a:t>
+            <a:t>4. Protegido por medidas de segurança robustas, como criptografia de dados.</a:t>
           </a:r>
         </a:p>
       </dsp:txBody>
@@ -32570,7 +32622,27 @@
                 <a:effectLst/>
                 <a:latin typeface="Söhne"/>
               </a:rPr>
-              <a:t>À medida que a indústria pet continua a crescer e a se digitalizar, a demanda por um gerenciamento mais eficiente e integrado torna-se cada vez mais evidente. O PetConnect nasce da necessidade de simplificar operações complexas em petshops, oferecendo uma plataforma ágil e adaptada para o mundo moderno. Nosso objetivo hoje é mergulhar na visão por trás do PetConnect, entender seus objetivos fundamentais e explorar as funcionalidades que tornam nosso sistema uma peça chave para o sucesso de qualquer petshop.</a:t>
+              <a:t>À medida que a indústria pet continua a crescer e a se digitalizar, a demanda por um gerenciamento mais eficiente e integrado torna-se cada vez mais evidente. O PetConnect nasce da necessidade de simplificar operações complexas em petshops, oferecendo uma plataforma ágil e adaptada para o mundo moderno. </a:t>
+            </a:r>
+            <a:r>
+              <a:rPr lang="pt-BR" b="0" i="0">
+                <a:solidFill>
+                  <a:srgbClr val="ECECEC"/>
+                </a:solidFill>
+                <a:effectLst/>
+                <a:latin typeface="Söhne"/>
+              </a:rPr>
+              <a:t>Nosso propósito </a:t>
+            </a:r>
+            <a:r>
+              <a:rPr lang="pt-BR" b="0" i="0" dirty="0">
+                <a:solidFill>
+                  <a:srgbClr val="ECECEC"/>
+                </a:solidFill>
+                <a:effectLst/>
+                <a:latin typeface="Söhne"/>
+              </a:rPr>
+              <a:t>hoje é mergulhar na visão por trás do PetConnect, entender seus objetivos fundamentais e explorar as funcionalidades que tornam nosso sistema uma peça chave para o sucesso de qualquer petshop.</a:t>
             </a:r>
           </a:p>
         </p:txBody>
@@ -33226,7 +33298,7 @@
             <p:ph sz="quarter" idx="13"/>
             <p:extLst>
               <p:ext uri="{D42A27DB-BD31-4B8C-83A1-F6EECF244321}">
-                <p14:modId xmlns:p14="http://schemas.microsoft.com/office/powerpoint/2010/main" val="1713413792"/>
+                <p14:modId xmlns:p14="http://schemas.microsoft.com/office/powerpoint/2010/main" val="1220633191"/>
               </p:ext>
             </p:extLst>
           </p:nvPr>
@@ -35346,12 +35418,22 @@
 </file>
 
 <file path=customXml/item1.xml><?xml version="1.0" encoding="utf-8"?>
-<?mso-contentType ?>
-<FormTemplates xmlns="http://schemas.microsoft.com/sharepoint/v3/contenttype/forms">
-  <Display>DocumentLibraryForm</Display>
-  <Edit>DocumentLibraryForm</Edit>
-  <New>DocumentLibraryForm</New>
-</FormTemplates>
+<p:properties xmlns:p="http://schemas.microsoft.com/office/2006/metadata/properties" xmlns:xsi="http://www.w3.org/2001/XMLSchema-instance" xmlns:pc="http://schemas.microsoft.com/office/infopath/2007/PartnerControls">
+  <documentManagement>
+    <Status xmlns="71af3243-3dd4-4a8d-8c0d-dd76da1f02a5">Not started</Status>
+    <_ip_UnifiedCompliancePolicyUIAction xmlns="http://schemas.microsoft.com/sharepoint/v3" xsi:nil="true"/>
+    <Image xmlns="71af3243-3dd4-4a8d-8c0d-dd76da1f02a5">
+      <Url xsi:nil="true"/>
+      <Description xsi:nil="true"/>
+    </Image>
+    <_ip_UnifiedCompliancePolicyProperties xmlns="http://schemas.microsoft.com/sharepoint/v3" xsi:nil="true"/>
+    <lcf76f155ced4ddcb4097134ff3c332f xmlns="71af3243-3dd4-4a8d-8c0d-dd76da1f02a5">
+      <Terms xmlns="http://schemas.microsoft.com/office/infopath/2007/PartnerControls"/>
+    </lcf76f155ced4ddcb4097134ff3c332f>
+    <TaxCatchAll xmlns="230e9df3-be65-4c73-a93b-d1236ebd677e"/>
+    <MediaServiceKeyPoints xmlns="71af3243-3dd4-4a8d-8c0d-dd76da1f02a5" xsi:nil="true"/>
+  </documentManagement>
+</p:properties>
 </file>
 
 <file path=customXml/item2.xml><?xml version="1.0" encoding="utf-8"?>
@@ -35631,28 +35713,22 @@
 </file>
 
 <file path=customXml/item3.xml><?xml version="1.0" encoding="utf-8"?>
-<p:properties xmlns:p="http://schemas.microsoft.com/office/2006/metadata/properties" xmlns:xsi="http://www.w3.org/2001/XMLSchema-instance" xmlns:pc="http://schemas.microsoft.com/office/infopath/2007/PartnerControls">
-  <documentManagement>
-    <Status xmlns="71af3243-3dd4-4a8d-8c0d-dd76da1f02a5">Not started</Status>
-    <_ip_UnifiedCompliancePolicyUIAction xmlns="http://schemas.microsoft.com/sharepoint/v3" xsi:nil="true"/>
-    <Image xmlns="71af3243-3dd4-4a8d-8c0d-dd76da1f02a5">
-      <Url xsi:nil="true"/>
-      <Description xsi:nil="true"/>
-    </Image>
-    <_ip_UnifiedCompliancePolicyProperties xmlns="http://schemas.microsoft.com/sharepoint/v3" xsi:nil="true"/>
-    <lcf76f155ced4ddcb4097134ff3c332f xmlns="71af3243-3dd4-4a8d-8c0d-dd76da1f02a5">
-      <Terms xmlns="http://schemas.microsoft.com/office/infopath/2007/PartnerControls"/>
-    </lcf76f155ced4ddcb4097134ff3c332f>
-    <TaxCatchAll xmlns="230e9df3-be65-4c73-a93b-d1236ebd677e"/>
-    <MediaServiceKeyPoints xmlns="71af3243-3dd4-4a8d-8c0d-dd76da1f02a5" xsi:nil="true"/>
-  </documentManagement>
-</p:properties>
+<?mso-contentType ?>
+<FormTemplates xmlns="http://schemas.microsoft.com/sharepoint/v3/contenttype/forms">
+  <Display>DocumentLibraryForm</Display>
+  <Edit>DocumentLibraryForm</Edit>
+  <New>DocumentLibraryForm</New>
+</FormTemplates>
 </file>
 
 <file path=customXml/itemProps1.xml><?xml version="1.0" encoding="utf-8"?>
-<ds:datastoreItem xmlns:ds="http://schemas.openxmlformats.org/officeDocument/2006/customXml" ds:itemID="{1760681D-E858-4FCC-ACDF-E8F8408B9221}">
+<ds:datastoreItem xmlns:ds="http://schemas.openxmlformats.org/officeDocument/2006/customXml" ds:itemID="{92204B39-6EAA-4677-8C8D-C27F01CF8A37}">
   <ds:schemaRefs>
-    <ds:schemaRef ds:uri="http://schemas.microsoft.com/sharepoint/v3/contenttype/forms"/>
+    <ds:schemaRef ds:uri="http://schemas.microsoft.com/office/2006/metadata/properties"/>
+    <ds:schemaRef ds:uri="http://schemas.microsoft.com/office/infopath/2007/PartnerControls"/>
+    <ds:schemaRef ds:uri="71af3243-3dd4-4a8d-8c0d-dd76da1f02a5"/>
+    <ds:schemaRef ds:uri="http://schemas.microsoft.com/sharepoint/v3"/>
+    <ds:schemaRef ds:uri="230e9df3-be65-4c73-a93b-d1236ebd677e"/>
   </ds:schemaRefs>
 </ds:datastoreItem>
 </file>
@@ -35679,13 +35755,9 @@
 </file>
 
 <file path=customXml/itemProps3.xml><?xml version="1.0" encoding="utf-8"?>
-<ds:datastoreItem xmlns:ds="http://schemas.openxmlformats.org/officeDocument/2006/customXml" ds:itemID="{92204B39-6EAA-4677-8C8D-C27F01CF8A37}">
+<ds:datastoreItem xmlns:ds="http://schemas.openxmlformats.org/officeDocument/2006/customXml" ds:itemID="{1760681D-E858-4FCC-ACDF-E8F8408B9221}">
   <ds:schemaRefs>
-    <ds:schemaRef ds:uri="http://schemas.microsoft.com/office/2006/metadata/properties"/>
-    <ds:schemaRef ds:uri="http://schemas.microsoft.com/office/infopath/2007/PartnerControls"/>
-    <ds:schemaRef ds:uri="71af3243-3dd4-4a8d-8c0d-dd76da1f02a5"/>
-    <ds:schemaRef ds:uri="http://schemas.microsoft.com/sharepoint/v3"/>
-    <ds:schemaRef ds:uri="230e9df3-be65-4c73-a93b-d1236ebd677e"/>
+    <ds:schemaRef ds:uri="http://schemas.microsoft.com/sharepoint/v3/contenttype/forms"/>
   </ds:schemaRefs>
 </ds:datastoreItem>
 </file>

</xml_diff>